<commit_message>
Update Disney World assignment presentation with changes
</commit_message>
<xml_diff>
--- a/Data Science - Disney World assignment.pptx
+++ b/Data Science - Disney World assignment.pptx
@@ -5344,7 +5344,7 @@
         </p:nvSpPr>
         <p:spPr>
           <a:xfrm rot="0">
-            <a:off x="2155972" y="5504180"/>
+            <a:off x="2157181" y="6422376"/>
             <a:ext cx="4199874" cy="1073785"/>
           </a:xfrm>
           <a:prstGeom prst="rect">
@@ -5388,7 +5388,7 @@
         </p:nvSpPr>
         <p:spPr>
           <a:xfrm rot="0">
-            <a:off x="7044063" y="6498576"/>
+            <a:off x="7044063" y="7416772"/>
             <a:ext cx="4199874" cy="1627251"/>
           </a:xfrm>
           <a:prstGeom prst="rect">
@@ -5525,7 +5525,7 @@
         </p:nvSpPr>
         <p:spPr>
           <a:xfrm rot="0">
-            <a:off x="2158389" y="6498576"/>
+            <a:off x="2159597" y="7416772"/>
             <a:ext cx="4199874" cy="655701"/>
           </a:xfrm>
           <a:prstGeom prst="rect">
@@ -5566,7 +5566,7 @@
         </p:nvSpPr>
         <p:spPr>
           <a:xfrm rot="0">
-            <a:off x="7044063" y="5504180"/>
+            <a:off x="7044063" y="6422376"/>
             <a:ext cx="4199874" cy="530860"/>
           </a:xfrm>
           <a:prstGeom prst="rect">
@@ -5610,7 +5610,7 @@
         </p:nvSpPr>
         <p:spPr>
           <a:xfrm rot="0">
-            <a:off x="12598473" y="6498576"/>
+            <a:off x="12475041" y="7505686"/>
             <a:ext cx="4199874" cy="979551"/>
           </a:xfrm>
           <a:prstGeom prst="rect">
@@ -5675,7 +5675,7 @@
         </p:nvSpPr>
         <p:spPr>
           <a:xfrm rot="0">
-            <a:off x="12598473" y="5415266"/>
+            <a:off x="12475041" y="6422376"/>
             <a:ext cx="4611314" cy="1073785"/>
           </a:xfrm>
           <a:prstGeom prst="rect">
@@ -6624,7 +6624,7 @@
                 <a:cs typeface="Handy Casual"/>
                 <a:sym typeface="Handy Casual"/>
               </a:rPr>
-              <a:t>Attraction features (Thrill Rides, Family Rides, .. )</a:t>
+              <a:t>Attraction features (Rides, ... )</a:t>
             </a:r>
           </a:p>
         </p:txBody>
@@ -7178,6 +7178,263 @@
                 <a:sym typeface="Handy Casual"/>
               </a:rPr>
               <a:t>data/waiting times</a:t>
+            </a:r>
+          </a:p>
+        </p:txBody>
+      </p:sp>
+      <p:sp>
+        <p:nvSpPr>
+          <p:cNvPr name="Freeform 31" id="31"/>
+          <p:cNvSpPr/>
+          <p:nvPr/>
+        </p:nvSpPr>
+        <p:spPr>
+          <a:xfrm flipH="false" flipV="false" rot="0">
+            <a:off x="15006845" y="355001"/>
+            <a:ext cx="2931729" cy="1210357"/>
+          </a:xfrm>
+          <a:custGeom>
+            <a:avLst/>
+            <a:gdLst/>
+            <a:ahLst/>
+            <a:cxnLst/>
+            <a:rect r="r" b="b" t="t" l="l"/>
+            <a:pathLst>
+              <a:path h="1210357" w="2931729">
+                <a:moveTo>
+                  <a:pt x="0" y="0"/>
+                </a:moveTo>
+                <a:lnTo>
+                  <a:pt x="2931729" y="0"/>
+                </a:lnTo>
+                <a:lnTo>
+                  <a:pt x="2931729" y="1210357"/>
+                </a:lnTo>
+                <a:lnTo>
+                  <a:pt x="0" y="1210357"/>
+                </a:lnTo>
+                <a:lnTo>
+                  <a:pt x="0" y="0"/>
+                </a:lnTo>
+                <a:close/>
+              </a:path>
+            </a:pathLst>
+          </a:custGeom>
+          <a:blipFill>
+            <a:blip r:embed="rId7">
+              <a:extLst>
+                <a:ext uri="{96DAC541-7B7A-43D3-8B79-37D633B846F1}">
+                  <asvg:svgBlip xmlns:asvg="http://schemas.microsoft.com/office/drawing/2016/SVG/main" r:embed="rId8"/>
+                </a:ext>
+              </a:extLst>
+            </a:blip>
+            <a:stretch>
+              <a:fillRect l="0" t="0" r="0" b="0"/>
+            </a:stretch>
+          </a:blipFill>
+        </p:spPr>
+      </p:sp>
+      <p:sp>
+        <p:nvSpPr>
+          <p:cNvPr name="TextBox 32" id="32"/>
+          <p:cNvSpPr txBox="true"/>
+          <p:nvPr/>
+        </p:nvSpPr>
+        <p:spPr>
+          <a:xfrm rot="0">
+            <a:off x="15302120" y="764576"/>
+            <a:ext cx="2367625" cy="331851"/>
+          </a:xfrm>
+          <a:prstGeom prst="rect">
+            <a:avLst/>
+          </a:prstGeom>
+        </p:spPr>
+        <p:txBody>
+          <a:bodyPr anchor="t" rtlCol="false" tIns="0" lIns="0" bIns="0" rIns="0">
+            <a:spAutoFit/>
+          </a:bodyPr>
+          <a:lstStyle/>
+          <a:p>
+            <a:pPr algn="just">
+              <a:lnSpc>
+                <a:spcPts val="2622"/>
+              </a:lnSpc>
+            </a:pPr>
+            <a:r>
+              <a:rPr lang="en-US" sz="2300">
+                <a:solidFill>
+                  <a:srgbClr val="000000"/>
+                </a:solidFill>
+                <a:latin typeface="Handy Casual"/>
+                <a:ea typeface="Handy Casual"/>
+                <a:cs typeface="Handy Casual"/>
+                <a:sym typeface="Handy Casual"/>
+              </a:rPr>
+              <a:t>Frontend and Output</a:t>
+            </a:r>
+          </a:p>
+        </p:txBody>
+      </p:sp>
+      <p:sp>
+        <p:nvSpPr>
+          <p:cNvPr name="TextBox 33" id="33"/>
+          <p:cNvSpPr txBox="true"/>
+          <p:nvPr/>
+        </p:nvSpPr>
+        <p:spPr>
+          <a:xfrm rot="0">
+            <a:off x="15006845" y="3027589"/>
+            <a:ext cx="4685531" cy="331851"/>
+          </a:xfrm>
+          <a:prstGeom prst="rect">
+            <a:avLst/>
+          </a:prstGeom>
+        </p:spPr>
+        <p:txBody>
+          <a:bodyPr anchor="t" rtlCol="false" tIns="0" lIns="0" bIns="0" rIns="0">
+            <a:spAutoFit/>
+          </a:bodyPr>
+          <a:lstStyle/>
+          <a:p>
+            <a:pPr algn="just">
+              <a:lnSpc>
+                <a:spcPts val="2622"/>
+              </a:lnSpc>
+            </a:pPr>
+            <a:r>
+              <a:rPr lang="en-US" sz="2300">
+                <a:solidFill>
+                  <a:srgbClr val="000000"/>
+                </a:solidFill>
+                <a:latin typeface="Handy Casual"/>
+                <a:ea typeface="Handy Casual"/>
+                <a:cs typeface="Handy Casual"/>
+                <a:sym typeface="Handy Casual"/>
+              </a:rPr>
+              <a:t>Flask routes (/home, /planning)</a:t>
+            </a:r>
+          </a:p>
+        </p:txBody>
+      </p:sp>
+      <p:sp>
+        <p:nvSpPr>
+          <p:cNvPr name="TextBox 34" id="34"/>
+          <p:cNvSpPr txBox="true"/>
+          <p:nvPr/>
+        </p:nvSpPr>
+        <p:spPr>
+          <a:xfrm rot="0">
+            <a:off x="15006845" y="2281782"/>
+            <a:ext cx="4685531" cy="411861"/>
+          </a:xfrm>
+          <a:prstGeom prst="rect">
+            <a:avLst/>
+          </a:prstGeom>
+        </p:spPr>
+        <p:txBody>
+          <a:bodyPr anchor="t" rtlCol="false" tIns="0" lIns="0" bIns="0" rIns="0">
+            <a:spAutoFit/>
+          </a:bodyPr>
+          <a:lstStyle/>
+          <a:p>
+            <a:pPr algn="just">
+              <a:lnSpc>
+                <a:spcPts val="3191"/>
+              </a:lnSpc>
+            </a:pPr>
+            <a:r>
+              <a:rPr lang="en-US" sz="2799">
+                <a:solidFill>
+                  <a:srgbClr val="000000"/>
+                </a:solidFill>
+                <a:latin typeface="Handy Casual"/>
+                <a:ea typeface="Handy Casual"/>
+                <a:cs typeface="Handy Casual"/>
+                <a:sym typeface="Handy Casual"/>
+              </a:rPr>
+              <a:t>Front end</a:t>
+            </a:r>
+          </a:p>
+        </p:txBody>
+      </p:sp>
+      <p:sp>
+        <p:nvSpPr>
+          <p:cNvPr name="TextBox 35" id="35"/>
+          <p:cNvSpPr txBox="true"/>
+          <p:nvPr/>
+        </p:nvSpPr>
+        <p:spPr>
+          <a:xfrm rot="0">
+            <a:off x="15006845" y="3491982"/>
+            <a:ext cx="3060342" cy="655701"/>
+          </a:xfrm>
+          <a:prstGeom prst="rect">
+            <a:avLst/>
+          </a:prstGeom>
+        </p:spPr>
+        <p:txBody>
+          <a:bodyPr anchor="t" rtlCol="false" tIns="0" lIns="0" bIns="0" rIns="0">
+            <a:spAutoFit/>
+          </a:bodyPr>
+          <a:lstStyle/>
+          <a:p>
+            <a:pPr algn="just">
+              <a:lnSpc>
+                <a:spcPts val="2622"/>
+              </a:lnSpc>
+            </a:pPr>
+            <a:r>
+              <a:rPr lang="en-US" sz="2300">
+                <a:solidFill>
+                  <a:srgbClr val="000000"/>
+                </a:solidFill>
+                <a:latin typeface="Handy Casual"/>
+                <a:ea typeface="Handy Casual"/>
+                <a:cs typeface="Handy Casual"/>
+                <a:sym typeface="Handy Casual"/>
+              </a:rPr>
+              <a:t>User inputs: Dates, weather preferences, attractions.</a:t>
+            </a:r>
+          </a:p>
+        </p:txBody>
+      </p:sp>
+      <p:sp>
+        <p:nvSpPr>
+          <p:cNvPr name="TextBox 36" id="36"/>
+          <p:cNvSpPr txBox="true"/>
+          <p:nvPr/>
+        </p:nvSpPr>
+        <p:spPr>
+          <a:xfrm rot="0">
+            <a:off x="15006845" y="4582852"/>
+            <a:ext cx="4685531" cy="411861"/>
+          </a:xfrm>
+          <a:prstGeom prst="rect">
+            <a:avLst/>
+          </a:prstGeom>
+        </p:spPr>
+        <p:txBody>
+          <a:bodyPr anchor="t" rtlCol="false" tIns="0" lIns="0" bIns="0" rIns="0">
+            <a:spAutoFit/>
+          </a:bodyPr>
+          <a:lstStyle/>
+          <a:p>
+            <a:pPr algn="just">
+              <a:lnSpc>
+                <a:spcPts val="3191"/>
+              </a:lnSpc>
+            </a:pPr>
+            <a:r>
+              <a:rPr lang="en-US" sz="2799">
+                <a:solidFill>
+                  <a:srgbClr val="000000"/>
+                </a:solidFill>
+                <a:latin typeface="Handy Casual"/>
+                <a:ea typeface="Handy Casual"/>
+                <a:cs typeface="Handy Casual"/>
+                <a:sym typeface="Handy Casual"/>
+              </a:rPr>
+              <a:t>Front end</a:t>
             </a:r>
           </a:p>
         </p:txBody>

</xml_diff>

<commit_message>
Update Disney World assignment presentation
</commit_message>
<xml_diff>
--- a/Data Science - Disney World assignment.pptx
+++ b/Data Science - Disney World assignment.pptx
@@ -6829,8 +6829,8 @@
         </p:blipFill>
         <p:spPr>
           <a:xfrm flipH="false" flipV="false" rot="0">
-            <a:off x="15689723" y="1874579"/>
-            <a:ext cx="1482631" cy="1647368"/>
+            <a:off x="15689723" y="1417779"/>
+            <a:ext cx="1233480" cy="1370534"/>
           </a:xfrm>
           <a:prstGeom prst="rect">
             <a:avLst/>
@@ -7267,7 +7267,7 @@
         </p:nvSpPr>
         <p:spPr>
           <a:xfrm>
-            <a:off x="16691594" y="5715089"/>
+            <a:off x="16508600" y="5488773"/>
             <a:ext cx="0" cy="640621"/>
           </a:xfrm>
           <a:prstGeom prst="line">
@@ -7292,7 +7292,7 @@
         <p:spPr>
           <a:xfrm>
             <a:off x="14202857" y="5499496"/>
-            <a:ext cx="1486866" cy="1564849"/>
+            <a:ext cx="1486866" cy="1506419"/>
           </a:xfrm>
           <a:prstGeom prst="line">
             <a:avLst/>
@@ -7971,8 +7971,8 @@
         </p:nvSpPr>
         <p:spPr>
           <a:xfrm rot="0">
-            <a:off x="15689723" y="4642945"/>
-            <a:ext cx="4685531" cy="331851"/>
+            <a:off x="15689723" y="3554809"/>
+            <a:ext cx="2400430" cy="655701"/>
           </a:xfrm>
           <a:prstGeom prst="rect">
             <a:avLst/>
@@ -8012,7 +8012,7 @@
         </p:nvSpPr>
         <p:spPr>
           <a:xfrm rot="0">
-            <a:off x="15689723" y="3878659"/>
+            <a:off x="15689723" y="2925001"/>
             <a:ext cx="4685531" cy="411861"/>
           </a:xfrm>
           <a:prstGeom prst="rect">
@@ -8053,8 +8053,8 @@
         </p:nvSpPr>
         <p:spPr>
           <a:xfrm rot="0">
-            <a:off x="15689723" y="5039154"/>
-            <a:ext cx="3060342" cy="655701"/>
+            <a:off x="15731394" y="4381960"/>
+            <a:ext cx="2310120" cy="979551"/>
           </a:xfrm>
           <a:prstGeom prst="rect">
             <a:avLst/>
@@ -8094,7 +8094,7 @@
         </p:nvSpPr>
         <p:spPr>
           <a:xfrm rot="0">
-            <a:off x="15747387" y="8305129"/>
+            <a:off x="15731394" y="7796269"/>
             <a:ext cx="4685531" cy="411861"/>
           </a:xfrm>
           <a:prstGeom prst="rect">
@@ -8135,8 +8135,8 @@
         </p:nvSpPr>
         <p:spPr>
           <a:xfrm rot="0">
-            <a:off x="15747387" y="9050365"/>
-            <a:ext cx="4685531" cy="331851"/>
+            <a:off x="15731394" y="8348320"/>
+            <a:ext cx="2252455" cy="331851"/>
           </a:xfrm>
           <a:prstGeom prst="rect">
             <a:avLst/>
@@ -8163,7 +8163,7 @@
                 <a:cs typeface="Handy Casual"/>
                 <a:sym typeface="Handy Casual"/>
               </a:rPr>
-              <a:t>Trip plan recommendations.</a:t>
+              <a:t>Trip recommended plan.</a:t>
             </a:r>
           </a:p>
         </p:txBody>
@@ -8176,8 +8176,8 @@
         </p:nvSpPr>
         <p:spPr>
           <a:xfrm rot="0">
-            <a:off x="15747387" y="9470399"/>
-            <a:ext cx="3060342" cy="655701"/>
+            <a:off x="15747387" y="8899246"/>
+            <a:ext cx="2351631" cy="655701"/>
           </a:xfrm>
           <a:prstGeom prst="rect">
             <a:avLst/>

</xml_diff>